<commit_message>
Enfermeras solas y arreglo de ppt
</commit_message>
<xml_diff>
--- a/Tesis/Nicolas/Análisis de Datos.pptx
+++ b/Tesis/Nicolas/Análisis de Datos.pptx
@@ -216,7 +216,7 @@
           <a:p>
             <a:fld id="{E4272C49-D048-410C-98E1-591529983809}" type="datetimeFigureOut">
               <a:rPr lang="es-CL" smtClean="0"/>
-              <a:t>11-07-2017</a:t>
+              <a:t>12-07-2017</a:t>
             </a:fld>
             <a:endParaRPr lang="es-CL"/>
           </a:p>
@@ -1205,7 +1205,7 @@
           <a:p>
             <a:fld id="{4F5AD7BA-F6AA-4AAB-9A4E-937765467DC4}" type="datetimeFigureOut">
               <a:rPr lang="es-CL" smtClean="0"/>
-              <a:t>11-07-2017</a:t>
+              <a:t>12-07-2017</a:t>
             </a:fld>
             <a:endParaRPr lang="es-CL"/>
           </a:p>
@@ -1413,7 +1413,7 @@
           <a:p>
             <a:fld id="{4F5AD7BA-F6AA-4AAB-9A4E-937765467DC4}" type="datetimeFigureOut">
               <a:rPr lang="es-CL" smtClean="0"/>
-              <a:t>11-07-2017</a:t>
+              <a:t>12-07-2017</a:t>
             </a:fld>
             <a:endParaRPr lang="es-CL"/>
           </a:p>
@@ -1669,7 +1669,7 @@
           <a:p>
             <a:fld id="{4F5AD7BA-F6AA-4AAB-9A4E-937765467DC4}" type="datetimeFigureOut">
               <a:rPr lang="es-CL" smtClean="0"/>
-              <a:t>11-07-2017</a:t>
+              <a:t>12-07-2017</a:t>
             </a:fld>
             <a:endParaRPr lang="es-CL"/>
           </a:p>
@@ -1843,7 +1843,7 @@
           <a:p>
             <a:fld id="{4F5AD7BA-F6AA-4AAB-9A4E-937765467DC4}" type="datetimeFigureOut">
               <a:rPr lang="es-CL" smtClean="0"/>
-              <a:t>11-07-2017</a:t>
+              <a:t>12-07-2017</a:t>
             </a:fld>
             <a:endParaRPr lang="es-CL"/>
           </a:p>
@@ -2186,7 +2186,7 @@
           <a:p>
             <a:fld id="{4F5AD7BA-F6AA-4AAB-9A4E-937765467DC4}" type="datetimeFigureOut">
               <a:rPr lang="es-CL" smtClean="0"/>
-              <a:t>11-07-2017</a:t>
+              <a:t>12-07-2017</a:t>
             </a:fld>
             <a:endParaRPr lang="es-CL"/>
           </a:p>
@@ -2461,7 +2461,7 @@
           <a:p>
             <a:fld id="{4F5AD7BA-F6AA-4AAB-9A4E-937765467DC4}" type="datetimeFigureOut">
               <a:rPr lang="es-CL" smtClean="0"/>
-              <a:t>11-07-2017</a:t>
+              <a:t>12-07-2017</a:t>
             </a:fld>
             <a:endParaRPr lang="es-CL"/>
           </a:p>
@@ -2840,7 +2840,7 @@
           <a:p>
             <a:fld id="{4F5AD7BA-F6AA-4AAB-9A4E-937765467DC4}" type="datetimeFigureOut">
               <a:rPr lang="es-CL" smtClean="0"/>
-              <a:t>11-07-2017</a:t>
+              <a:t>12-07-2017</a:t>
             </a:fld>
             <a:endParaRPr lang="es-CL"/>
           </a:p>
@@ -2958,7 +2958,7 @@
           <a:p>
             <a:fld id="{4F5AD7BA-F6AA-4AAB-9A4E-937765467DC4}" type="datetimeFigureOut">
               <a:rPr lang="es-CL" smtClean="0"/>
-              <a:t>11-07-2017</a:t>
+              <a:t>12-07-2017</a:t>
             </a:fld>
             <a:endParaRPr lang="es-CL"/>
           </a:p>
@@ -3129,7 +3129,7 @@
           <a:p>
             <a:fld id="{4F5AD7BA-F6AA-4AAB-9A4E-937765467DC4}" type="datetimeFigureOut">
               <a:rPr lang="es-CL" smtClean="0"/>
-              <a:t>11-07-2017</a:t>
+              <a:t>12-07-2017</a:t>
             </a:fld>
             <a:endParaRPr lang="es-CL"/>
           </a:p>
@@ -3483,7 +3483,7 @@
           <a:p>
             <a:fld id="{4F5AD7BA-F6AA-4AAB-9A4E-937765467DC4}" type="datetimeFigureOut">
               <a:rPr lang="es-CL" smtClean="0"/>
-              <a:t>11-07-2017</a:t>
+              <a:t>12-07-2017</a:t>
             </a:fld>
             <a:endParaRPr lang="es-CL"/>
           </a:p>
@@ -3865,7 +3865,7 @@
           <a:p>
             <a:fld id="{4F5AD7BA-F6AA-4AAB-9A4E-937765467DC4}" type="datetimeFigureOut">
               <a:rPr lang="es-CL" smtClean="0"/>
-              <a:t>11-07-2017</a:t>
+              <a:t>12-07-2017</a:t>
             </a:fld>
             <a:endParaRPr lang="es-CL"/>
           </a:p>
@@ -4152,7 +4152,7 @@
           <a:p>
             <a:fld id="{4F5AD7BA-F6AA-4AAB-9A4E-937765467DC4}" type="datetimeFigureOut">
               <a:rPr lang="es-CL" smtClean="0"/>
-              <a:t>11-07-2017</a:t>
+              <a:t>12-07-2017</a:t>
             </a:fld>
             <a:endParaRPr lang="es-CL"/>
           </a:p>
@@ -6868,7 +6868,6 @@
               <a:rPr lang="es-CL" dirty="0"/>
               <a:t>3</a:t>
             </a:r>
-            <a:endParaRPr lang="es-CL" dirty="0"/>
           </a:p>
         </p:txBody>
       </p:sp>
@@ -7137,7 +7136,6 @@
               <a:rPr lang="es-CL" dirty="0"/>
               <a:t>5</a:t>
             </a:r>
-            <a:endParaRPr lang="es-CL" dirty="0"/>
           </a:p>
         </p:txBody>
       </p:sp>
@@ -7196,7 +7194,6 @@
               <a:rPr lang="es-CL" dirty="0"/>
               <a:t>7</a:t>
             </a:r>
-            <a:endParaRPr lang="es-CL" dirty="0"/>
           </a:p>
         </p:txBody>
       </p:sp>
@@ -7226,7 +7223,6 @@
               <a:rPr lang="es-CL" dirty="0"/>
               <a:t>8</a:t>
             </a:r>
-            <a:endParaRPr lang="es-CL" dirty="0"/>
           </a:p>
         </p:txBody>
       </p:sp>
@@ -7256,7 +7252,6 @@
               <a:rPr lang="es-CL" dirty="0"/>
               <a:t>9</a:t>
             </a:r>
-            <a:endParaRPr lang="es-CL" dirty="0"/>
           </a:p>
         </p:txBody>
       </p:sp>
@@ -7562,14 +7557,14 @@
             <p:ph idx="1"/>
             <p:extLst>
               <p:ext uri="{D42A27DB-BD31-4B8C-83A1-F6EECF244321}">
-                <p14:modId xmlns:p14="http://schemas.microsoft.com/office/powerpoint/2010/main" val="1943715350"/>
+                <p14:modId xmlns:p14="http://schemas.microsoft.com/office/powerpoint/2010/main" val="3960950038"/>
               </p:ext>
             </p:extLst>
           </p:nvPr>
         </p:nvGraphicFramePr>
         <p:xfrm>
           <a:off x="818148" y="295725"/>
-          <a:ext cx="10369616" cy="5811894"/>
+          <a:ext cx="10369616" cy="5852160"/>
         </p:xfrm>
         <a:graphic>
           <a:graphicData uri="http://schemas.openxmlformats.org/drawingml/2006/table">
@@ -7583,7 +7578,7 @@
                 <a:gridCol w="1909011"/>
                 <a:gridCol w="6551595"/>
               </a:tblGrid>
-              <a:tr h="351716">
+              <a:tr h="270275">
                 <a:tc>
                   <a:txBody>
                     <a:bodyPr/>
@@ -7653,7 +7648,7 @@
                   <a:tcPr/>
                 </a:tc>
               </a:tr>
-              <a:tr h="443778">
+              <a:tr h="270275">
                 <a:tc>
                   <a:txBody>
                     <a:bodyPr/>
@@ -7719,7 +7714,7 @@
                   <a:tcPr/>
                 </a:tc>
               </a:tr>
-              <a:tr h="615503">
+              <a:tr h="472981">
                 <a:tc>
                   <a:txBody>
                     <a:bodyPr/>
@@ -7781,14 +7776,46 @@
                       </a:r>
                       <a:r>
                         <a:rPr lang="es-CL" baseline="0" dirty="0" smtClean="0"/>
-                        <a:t> entre Nutricionista y Médico (con Médico como líder – en % -).</a:t>
+                        <a:t> entre </a:t>
+                      </a:r>
+                      <a:r>
+                        <a:rPr lang="es-CL" baseline="0" dirty="0" smtClean="0"/>
+                        <a:t>nutricionista </a:t>
+                      </a:r>
+                      <a:r>
+                        <a:rPr lang="es-CL" baseline="0" dirty="0" smtClean="0"/>
+                        <a:t>y </a:t>
+                      </a:r>
+                      <a:r>
+                        <a:rPr lang="es-CL" baseline="0" dirty="0" smtClean="0"/>
+                        <a:t>médico </a:t>
+                      </a:r>
+                      <a:r>
+                        <a:rPr lang="es-CL" baseline="0" dirty="0" smtClean="0"/>
+                        <a:t>(con Médico como líder – en % -).</a:t>
                       </a:r>
                     </a:p>
                     <a:p>
                       <a:pPr algn="just"/>
                       <a:r>
                         <a:rPr lang="es-CL" baseline="0" dirty="0" smtClean="0"/>
-                        <a:t>Instanciado con líder Médico y con Nutricionista.</a:t>
+                        <a:t>Instanciado con líder </a:t>
+                      </a:r>
+                      <a:r>
+                        <a:rPr lang="es-CL" baseline="0" dirty="0" smtClean="0"/>
+                        <a:t>médico </a:t>
+                      </a:r>
+                      <a:r>
+                        <a:rPr lang="es-CL" baseline="0" dirty="0" smtClean="0"/>
+                        <a:t>y con </a:t>
+                      </a:r>
+                      <a:r>
+                        <a:rPr lang="es-CL" baseline="0" dirty="0" smtClean="0"/>
+                        <a:t>nutricionista</a:t>
+                      </a:r>
+                      <a:r>
+                        <a:rPr lang="es-CL" baseline="0" dirty="0" smtClean="0"/>
+                        <a:t>.</a:t>
                       </a:r>
                       <a:endParaRPr lang="es-CL" dirty="0" smtClean="0"/>
                     </a:p>
@@ -7796,7 +7823,7 @@
                   <a:tcPr/>
                 </a:tc>
               </a:tr>
-              <a:tr h="443778">
+              <a:tr h="270275">
                 <a:tc>
                   <a:txBody>
                     <a:bodyPr/>
@@ -7845,11 +7872,27 @@
                       <a:pPr algn="just"/>
                       <a:r>
                         <a:rPr lang="es-CL" dirty="0" smtClean="0"/>
-                        <a:t>Hay roles compartidos entre los Médicos y las</a:t>
+                        <a:t>Hay roles compartidos entre los </a:t>
+                      </a:r>
+                      <a:r>
+                        <a:rPr lang="es-CL" dirty="0" smtClean="0"/>
+                        <a:t>médicos </a:t>
+                      </a:r>
+                      <a:r>
+                        <a:rPr lang="es-CL" dirty="0" smtClean="0"/>
+                        <a:t>y las</a:t>
                       </a:r>
                       <a:r>
                         <a:rPr lang="es-CL" baseline="0" dirty="0" smtClean="0"/>
-                        <a:t> Enfermeras.</a:t>
+                        <a:t> </a:t>
+                      </a:r>
+                      <a:r>
+                        <a:rPr lang="es-CL" baseline="0" dirty="0" smtClean="0"/>
+                        <a:t>enfermeras</a:t>
+                      </a:r>
+                      <a:r>
+                        <a:rPr lang="es-CL" baseline="0" dirty="0" smtClean="0"/>
+                        <a:t>.</a:t>
                       </a:r>
                       <a:endParaRPr lang="es-CL" dirty="0"/>
                     </a:p>
@@ -7857,7 +7900,7 @@
                   <a:tcPr/>
                 </a:tc>
               </a:tr>
-              <a:tr h="615503">
+              <a:tr h="472981">
                 <a:tc>
                   <a:txBody>
                     <a:bodyPr/>
@@ -7935,7 +7978,15 @@
                       </a:r>
                       <a:r>
                         <a:rPr lang="es-CL" baseline="0" dirty="0" smtClean="0"/>
-                        <a:t> Médico y la enfermera interactúan de manera muy similar apoyándose ambos en los nutricionistas.</a:t>
+                        <a:t> </a:t>
+                      </a:r>
+                      <a:r>
+                        <a:rPr lang="es-CL" baseline="0" dirty="0" smtClean="0"/>
+                        <a:t>médico </a:t>
+                      </a:r>
+                      <a:r>
+                        <a:rPr lang="es-CL" baseline="0" dirty="0" smtClean="0"/>
+                        <a:t>y la enfermera interactúan de manera muy similar apoyándose ambos en los nutricionistas.</a:t>
                       </a:r>
                       <a:endParaRPr lang="es-CL" dirty="0"/>
                     </a:p>
@@ -7943,7 +7994,7 @@
                   <a:tcPr/>
                 </a:tc>
               </a:tr>
-              <a:tr h="615503">
+              <a:tr h="472981">
                 <a:tc>
                   <a:txBody>
                     <a:bodyPr/>
@@ -7997,7 +8048,11 @@
                       </a:r>
                       <a:r>
                         <a:rPr lang="es-CL" dirty="0" smtClean="0"/>
-                        <a:t>medico es eje central de</a:t>
+                        <a:t>médico </a:t>
+                      </a:r>
+                      <a:r>
+                        <a:rPr lang="es-CL" dirty="0" smtClean="0"/>
+                        <a:t>es eje central de</a:t>
                       </a:r>
                       <a:r>
                         <a:rPr lang="es-CL" baseline="0" dirty="0" smtClean="0"/>
@@ -8009,7 +8064,7 @@
                   <a:tcPr/>
                 </a:tc>
               </a:tr>
-              <a:tr h="615503">
+              <a:tr h="472981">
                 <a:tc>
                   <a:txBody>
                     <a:bodyPr/>
@@ -8056,10 +8111,30 @@
                     <a:bodyPr/>
                     <a:lstStyle/>
                     <a:p>
-                      <a:pPr algn="ctr"/>
+                      <a:pPr marL="0" marR="0" lvl="0" indent="0" algn="l" defTabSz="914400" rtl="0" eaLnBrk="1" fontAlgn="auto" latinLnBrk="0" hangingPunct="1">
+                        <a:lnSpc>
+                          <a:spcPct val="100000"/>
+                        </a:lnSpc>
+                        <a:spcBef>
+                          <a:spcPts val="0"/>
+                        </a:spcBef>
+                        <a:spcAft>
+                          <a:spcPts val="0"/>
+                        </a:spcAft>
+                        <a:buClrTx/>
+                        <a:buSzTx/>
+                        <a:buFontTx/>
+                        <a:buNone/>
+                        <a:tabLst/>
+                        <a:defRPr/>
+                      </a:pPr>
                       <a:r>
                         <a:rPr lang="es-CL" dirty="0" smtClean="0"/>
-                        <a:t>%</a:t>
+                        <a:t>El médico es eje central de</a:t>
+                      </a:r>
+                      <a:r>
+                        <a:rPr lang="es-CL" baseline="0" dirty="0" smtClean="0"/>
+                        <a:t>l tratamiento, apoyándose en la enfermera y los nutricionistas.</a:t>
                       </a:r>
                       <a:endParaRPr lang="es-CL" dirty="0"/>
                     </a:p>
@@ -8067,7 +8142,7 @@
                   <a:tcPr/>
                 </a:tc>
               </a:tr>
-              <a:tr h="443778">
+              <a:tr h="472981">
                 <a:tc>
                   <a:txBody>
                     <a:bodyPr/>
@@ -8114,10 +8189,14 @@
                     <a:bodyPr/>
                     <a:lstStyle/>
                     <a:p>
-                      <a:pPr algn="ctr"/>
+                      <a:pPr algn="l"/>
                       <a:r>
                         <a:rPr lang="es-CL" dirty="0" smtClean="0"/>
-                        <a:t>%</a:t>
+                        <a:t>El</a:t>
+                      </a:r>
+                      <a:r>
+                        <a:rPr lang="es-CL" baseline="0" dirty="0" smtClean="0"/>
+                        <a:t> médico y la enfermera interactúan de manera muy similar apoyándose ambos en los nutricionistas</a:t>
                       </a:r>
                       <a:endParaRPr lang="es-CL" dirty="0"/>
                     </a:p>
@@ -8125,7 +8204,7 @@
                   <a:tcPr/>
                 </a:tc>
               </a:tr>
-              <a:tr h="615503">
+              <a:tr h="472981">
                 <a:tc>
                   <a:txBody>
                     <a:bodyPr/>
@@ -8172,14 +8251,38 @@
                     <a:bodyPr/>
                     <a:lstStyle/>
                     <a:p>
-                      <a:pPr algn="l"/>
+                      <a:pPr marL="0" marR="0" lvl="0" indent="0" algn="l" defTabSz="914400" rtl="0" eaLnBrk="1" fontAlgn="auto" latinLnBrk="0" hangingPunct="1">
+                        <a:lnSpc>
+                          <a:spcPct val="100000"/>
+                        </a:lnSpc>
+                        <a:spcBef>
+                          <a:spcPts val="0"/>
+                        </a:spcBef>
+                        <a:spcAft>
+                          <a:spcPts val="0"/>
+                        </a:spcAft>
+                        <a:buClrTx/>
+                        <a:buSzTx/>
+                        <a:buFontTx/>
+                        <a:buNone/>
+                        <a:tabLst/>
+                        <a:defRPr/>
+                      </a:pPr>
+                      <a:r>
+                        <a:rPr lang="es-CL" dirty="0" smtClean="0"/>
+                        <a:t>El médico es eje central de</a:t>
+                      </a:r>
+                      <a:r>
+                        <a:rPr lang="es-CL" baseline="0" dirty="0" smtClean="0"/>
+                        <a:t>l tratamiento, apoyándose en la enfermera y los nutricionistas.</a:t>
+                      </a:r>
                       <a:endParaRPr lang="es-CL" dirty="0"/>
                     </a:p>
                   </a:txBody>
                   <a:tcPr/>
                 </a:tc>
               </a:tr>
-              <a:tr h="879290">
+              <a:tr h="675688">
                 <a:tc>
                   <a:txBody>
                     <a:bodyPr/>
@@ -8245,7 +8348,31 @@
                     <a:bodyPr/>
                     <a:lstStyle/>
                     <a:p>
-                      <a:pPr algn="l"/>
+                      <a:pPr marL="0" marR="0" lvl="0" indent="0" algn="l" defTabSz="914400" rtl="0" eaLnBrk="1" fontAlgn="auto" latinLnBrk="0" hangingPunct="1">
+                        <a:lnSpc>
+                          <a:spcPct val="100000"/>
+                        </a:lnSpc>
+                        <a:spcBef>
+                          <a:spcPts val="0"/>
+                        </a:spcBef>
+                        <a:spcAft>
+                          <a:spcPts val="0"/>
+                        </a:spcAft>
+                        <a:buClrTx/>
+                        <a:buSzTx/>
+                        <a:buFontTx/>
+                        <a:buNone/>
+                        <a:tabLst/>
+                        <a:defRPr/>
+                      </a:pPr>
+                      <a:r>
+                        <a:rPr lang="es-CL" dirty="0" smtClean="0"/>
+                        <a:t>El médico es eje central de</a:t>
+                      </a:r>
+                      <a:r>
+                        <a:rPr lang="es-CL" baseline="0" dirty="0" smtClean="0"/>
+                        <a:t>l tratamiento, apoyándose en la enfermera y los nutricionistas.</a:t>
+                      </a:r>
                       <a:endParaRPr lang="es-CL" dirty="0"/>
                     </a:p>
                   </a:txBody>
@@ -9304,13 +9431,8 @@
             </a:r>
             <a:r>
               <a:rPr lang="es-CL" sz="2400" dirty="0" smtClean="0"/>
-              <a:t>orma los grupos de manera más </a:t>
-            </a:r>
-            <a:r>
-              <a:rPr lang="es-CL" sz="2400" dirty="0" smtClean="0"/>
-              <a:t>diferenciada. </a:t>
-            </a:r>
-            <a:endParaRPr lang="es-CL" sz="2400" dirty="0" smtClean="0"/>
+              <a:t>orma los grupos de manera más diferenciada. </a:t>
+            </a:r>
           </a:p>
           <a:p>
             <a:pPr lvl="1"/>
@@ -9387,15 +9509,7 @@
                   <a:srgbClr val="0070C0"/>
                 </a:solidFill>
               </a:rPr>
-              <a:t>Un</a:t>
-            </a:r>
-            <a:r>
-              <a:rPr lang="es-CL" sz="2000" dirty="0" smtClean="0">
-                <a:solidFill>
-                  <a:srgbClr val="0070C0"/>
-                </a:solidFill>
-              </a:rPr>
-              <a:t> nodo</a:t>
+              <a:t>Un nodo</a:t>
             </a:r>
             <a:endParaRPr lang="es-CL" sz="4400" dirty="0">
               <a:solidFill>

</xml_diff>